<commit_message>
added urls for data download for 2b
</commit_message>
<xml_diff>
--- a/docs/ioanna_antonio_week_2_analysis_practical.pptx
+++ b/docs/ioanna_antonio_week_2_analysis_practical.pptx
@@ -199,7 +199,7 @@
           <a:p>
             <a:fld id="{E63B2B30-6B68-5649-8E90-3E3C690752BE}" type="datetimeFigureOut">
               <a:rPr lang="en-GB" smtClean="0"/>
-              <a:t>24/01/2019</a:t>
+              <a:t>30/01/2020</a:t>
             </a:fld>
             <a:endParaRPr lang="en-GB"/>
           </a:p>
@@ -263,35 +263,35 @@
           <a:p>
             <a:pPr lvl="0"/>
             <a:r>
-              <a:rPr lang="en-US" smtClean="0"/>
+              <a:rPr lang="en-US"/>
               <a:t>Click to edit Master text styles</a:t>
             </a:r>
           </a:p>
           <a:p>
             <a:pPr lvl="1"/>
             <a:r>
-              <a:rPr lang="en-US" smtClean="0"/>
+              <a:rPr lang="en-US"/>
               <a:t>Second level</a:t>
             </a:r>
           </a:p>
           <a:p>
             <a:pPr lvl="2"/>
             <a:r>
-              <a:rPr lang="en-US" smtClean="0"/>
+              <a:rPr lang="en-US"/>
               <a:t>Third level</a:t>
             </a:r>
           </a:p>
           <a:p>
             <a:pPr lvl="3"/>
             <a:r>
-              <a:rPr lang="en-US" smtClean="0"/>
+              <a:rPr lang="en-US"/>
               <a:t>Fourth level</a:t>
             </a:r>
           </a:p>
           <a:p>
             <a:pPr lvl="4"/>
             <a:r>
-              <a:rPr lang="en-US" smtClean="0"/>
+              <a:rPr lang="en-US"/>
               <a:t>Fifth level</a:t>
             </a:r>
             <a:endParaRPr lang="en-GB"/>
@@ -593,7 +593,7 @@
           </a:lstStyle>
           <a:p>
             <a:r>
-              <a:rPr lang="en-US" smtClean="0"/>
+              <a:rPr lang="en-US"/>
               <a:t>Click to edit Master title style</a:t>
             </a:r>
             <a:endParaRPr lang="en-GB"/>
@@ -658,7 +658,7 @@
           </a:lstStyle>
           <a:p>
             <a:r>
-              <a:rPr lang="en-US" smtClean="0"/>
+              <a:rPr lang="en-US"/>
               <a:t>Click to edit Master subtitle style</a:t>
             </a:r>
             <a:endParaRPr lang="en-GB"/>
@@ -682,7 +682,7 @@
           <a:p>
             <a:fld id="{D79BA4B9-CCE6-C14B-A854-25D57FDC82A2}" type="datetimeFigureOut">
               <a:rPr lang="en-GB" smtClean="0"/>
-              <a:t>24/01/2019</a:t>
+              <a:t>30/01/2020</a:t>
             </a:fld>
             <a:endParaRPr lang="en-GB"/>
           </a:p>
@@ -776,7 +776,7 @@
           <a:lstStyle/>
           <a:p>
             <a:r>
-              <a:rPr lang="en-US" smtClean="0"/>
+              <a:rPr lang="en-US"/>
               <a:t>Click to edit Master title style</a:t>
             </a:r>
             <a:endParaRPr lang="en-GB"/>
@@ -800,35 +800,35 @@
           <a:p>
             <a:pPr lvl="0"/>
             <a:r>
-              <a:rPr lang="en-US" smtClean="0"/>
+              <a:rPr lang="en-US"/>
               <a:t>Click to edit Master text styles</a:t>
             </a:r>
           </a:p>
           <a:p>
             <a:pPr lvl="1"/>
             <a:r>
-              <a:rPr lang="en-US" smtClean="0"/>
+              <a:rPr lang="en-US"/>
               <a:t>Second level</a:t>
             </a:r>
           </a:p>
           <a:p>
             <a:pPr lvl="2"/>
             <a:r>
-              <a:rPr lang="en-US" smtClean="0"/>
+              <a:rPr lang="en-US"/>
               <a:t>Third level</a:t>
             </a:r>
           </a:p>
           <a:p>
             <a:pPr lvl="3"/>
             <a:r>
-              <a:rPr lang="en-US" smtClean="0"/>
+              <a:rPr lang="en-US"/>
               <a:t>Fourth level</a:t>
             </a:r>
           </a:p>
           <a:p>
             <a:pPr lvl="4"/>
             <a:r>
-              <a:rPr lang="en-US" smtClean="0"/>
+              <a:rPr lang="en-US"/>
               <a:t>Fifth level</a:t>
             </a:r>
             <a:endParaRPr lang="en-GB"/>
@@ -852,7 +852,7 @@
           <a:p>
             <a:fld id="{D79BA4B9-CCE6-C14B-A854-25D57FDC82A2}" type="datetimeFigureOut">
               <a:rPr lang="en-GB" smtClean="0"/>
-              <a:t>24/01/2019</a:t>
+              <a:t>30/01/2020</a:t>
             </a:fld>
             <a:endParaRPr lang="en-GB"/>
           </a:p>
@@ -951,7 +951,7 @@
           <a:lstStyle/>
           <a:p>
             <a:r>
-              <a:rPr lang="en-US" smtClean="0"/>
+              <a:rPr lang="en-US"/>
               <a:t>Click to edit Master title style</a:t>
             </a:r>
             <a:endParaRPr lang="en-GB"/>
@@ -980,35 +980,35 @@
           <a:p>
             <a:pPr lvl="0"/>
             <a:r>
-              <a:rPr lang="en-US" smtClean="0"/>
+              <a:rPr lang="en-US"/>
               <a:t>Click to edit Master text styles</a:t>
             </a:r>
           </a:p>
           <a:p>
             <a:pPr lvl="1"/>
             <a:r>
-              <a:rPr lang="en-US" smtClean="0"/>
+              <a:rPr lang="en-US"/>
               <a:t>Second level</a:t>
             </a:r>
           </a:p>
           <a:p>
             <a:pPr lvl="2"/>
             <a:r>
-              <a:rPr lang="en-US" smtClean="0"/>
+              <a:rPr lang="en-US"/>
               <a:t>Third level</a:t>
             </a:r>
           </a:p>
           <a:p>
             <a:pPr lvl="3"/>
             <a:r>
-              <a:rPr lang="en-US" smtClean="0"/>
+              <a:rPr lang="en-US"/>
               <a:t>Fourth level</a:t>
             </a:r>
           </a:p>
           <a:p>
             <a:pPr lvl="4"/>
             <a:r>
-              <a:rPr lang="en-US" smtClean="0"/>
+              <a:rPr lang="en-US"/>
               <a:t>Fifth level</a:t>
             </a:r>
             <a:endParaRPr lang="en-GB"/>
@@ -1032,7 +1032,7 @@
           <a:p>
             <a:fld id="{D79BA4B9-CCE6-C14B-A854-25D57FDC82A2}" type="datetimeFigureOut">
               <a:rPr lang="en-GB" smtClean="0"/>
-              <a:t>24/01/2019</a:t>
+              <a:t>30/01/2020</a:t>
             </a:fld>
             <a:endParaRPr lang="en-GB"/>
           </a:p>
@@ -1126,7 +1126,7 @@
           <a:lstStyle/>
           <a:p>
             <a:r>
-              <a:rPr lang="en-US" smtClean="0"/>
+              <a:rPr lang="en-US"/>
               <a:t>Click to edit Master title style</a:t>
             </a:r>
             <a:endParaRPr lang="en-GB"/>
@@ -1150,35 +1150,35 @@
           <a:p>
             <a:pPr lvl="0"/>
             <a:r>
-              <a:rPr lang="en-US" smtClean="0"/>
+              <a:rPr lang="en-US"/>
               <a:t>Click to edit Master text styles</a:t>
             </a:r>
           </a:p>
           <a:p>
             <a:pPr lvl="1"/>
             <a:r>
-              <a:rPr lang="en-US" smtClean="0"/>
+              <a:rPr lang="en-US"/>
               <a:t>Second level</a:t>
             </a:r>
           </a:p>
           <a:p>
             <a:pPr lvl="2"/>
             <a:r>
-              <a:rPr lang="en-US" smtClean="0"/>
+              <a:rPr lang="en-US"/>
               <a:t>Third level</a:t>
             </a:r>
           </a:p>
           <a:p>
             <a:pPr lvl="3"/>
             <a:r>
-              <a:rPr lang="en-US" smtClean="0"/>
+              <a:rPr lang="en-US"/>
               <a:t>Fourth level</a:t>
             </a:r>
           </a:p>
           <a:p>
             <a:pPr lvl="4"/>
             <a:r>
-              <a:rPr lang="en-US" smtClean="0"/>
+              <a:rPr lang="en-US"/>
               <a:t>Fifth level</a:t>
             </a:r>
             <a:endParaRPr lang="en-GB"/>
@@ -1202,7 +1202,7 @@
           <a:p>
             <a:fld id="{D79BA4B9-CCE6-C14B-A854-25D57FDC82A2}" type="datetimeFigureOut">
               <a:rPr lang="en-GB" smtClean="0"/>
-              <a:t>24/01/2019</a:t>
+              <a:t>30/01/2020</a:t>
             </a:fld>
             <a:endParaRPr lang="en-GB"/>
           </a:p>
@@ -1305,7 +1305,7 @@
           </a:lstStyle>
           <a:p>
             <a:r>
-              <a:rPr lang="en-US" smtClean="0"/>
+              <a:rPr lang="en-US"/>
               <a:t>Click to edit Master title style</a:t>
             </a:r>
             <a:endParaRPr lang="en-GB"/>
@@ -1425,7 +1425,7 @@
           <a:p>
             <a:pPr lvl="0"/>
             <a:r>
-              <a:rPr lang="en-US" smtClean="0"/>
+              <a:rPr lang="en-US"/>
               <a:t>Click to edit Master text styles</a:t>
             </a:r>
           </a:p>
@@ -1448,7 +1448,7 @@
           <a:p>
             <a:fld id="{D79BA4B9-CCE6-C14B-A854-25D57FDC82A2}" type="datetimeFigureOut">
               <a:rPr lang="en-GB" smtClean="0"/>
-              <a:t>24/01/2019</a:t>
+              <a:t>30/01/2020</a:t>
             </a:fld>
             <a:endParaRPr lang="en-GB"/>
           </a:p>
@@ -1542,7 +1542,7 @@
           <a:lstStyle/>
           <a:p>
             <a:r>
-              <a:rPr lang="en-US" smtClean="0"/>
+              <a:rPr lang="en-US"/>
               <a:t>Click to edit Master title style</a:t>
             </a:r>
             <a:endParaRPr lang="en-GB"/>
@@ -1571,35 +1571,35 @@
           <a:p>
             <a:pPr lvl="0"/>
             <a:r>
-              <a:rPr lang="en-US" smtClean="0"/>
+              <a:rPr lang="en-US"/>
               <a:t>Click to edit Master text styles</a:t>
             </a:r>
           </a:p>
           <a:p>
             <a:pPr lvl="1"/>
             <a:r>
-              <a:rPr lang="en-US" smtClean="0"/>
+              <a:rPr lang="en-US"/>
               <a:t>Second level</a:t>
             </a:r>
           </a:p>
           <a:p>
             <a:pPr lvl="2"/>
             <a:r>
-              <a:rPr lang="en-US" smtClean="0"/>
+              <a:rPr lang="en-US"/>
               <a:t>Third level</a:t>
             </a:r>
           </a:p>
           <a:p>
             <a:pPr lvl="3"/>
             <a:r>
-              <a:rPr lang="en-US" smtClean="0"/>
+              <a:rPr lang="en-US"/>
               <a:t>Fourth level</a:t>
             </a:r>
           </a:p>
           <a:p>
             <a:pPr lvl="4"/>
             <a:r>
-              <a:rPr lang="en-US" smtClean="0"/>
+              <a:rPr lang="en-US"/>
               <a:t>Fifth level</a:t>
             </a:r>
             <a:endParaRPr lang="en-GB"/>
@@ -1628,35 +1628,35 @@
           <a:p>
             <a:pPr lvl="0"/>
             <a:r>
-              <a:rPr lang="en-US" smtClean="0"/>
+              <a:rPr lang="en-US"/>
               <a:t>Click to edit Master text styles</a:t>
             </a:r>
           </a:p>
           <a:p>
             <a:pPr lvl="1"/>
             <a:r>
-              <a:rPr lang="en-US" smtClean="0"/>
+              <a:rPr lang="en-US"/>
               <a:t>Second level</a:t>
             </a:r>
           </a:p>
           <a:p>
             <a:pPr lvl="2"/>
             <a:r>
-              <a:rPr lang="en-US" smtClean="0"/>
+              <a:rPr lang="en-US"/>
               <a:t>Third level</a:t>
             </a:r>
           </a:p>
           <a:p>
             <a:pPr lvl="3"/>
             <a:r>
-              <a:rPr lang="en-US" smtClean="0"/>
+              <a:rPr lang="en-US"/>
               <a:t>Fourth level</a:t>
             </a:r>
           </a:p>
           <a:p>
             <a:pPr lvl="4"/>
             <a:r>
-              <a:rPr lang="en-US" smtClean="0"/>
+              <a:rPr lang="en-US"/>
               <a:t>Fifth level</a:t>
             </a:r>
             <a:endParaRPr lang="en-GB"/>
@@ -1680,7 +1680,7 @@
           <a:p>
             <a:fld id="{D79BA4B9-CCE6-C14B-A854-25D57FDC82A2}" type="datetimeFigureOut">
               <a:rPr lang="en-GB" smtClean="0"/>
-              <a:t>24/01/2019</a:t>
+              <a:t>30/01/2020</a:t>
             </a:fld>
             <a:endParaRPr lang="en-GB"/>
           </a:p>
@@ -1779,7 +1779,7 @@
           <a:lstStyle/>
           <a:p>
             <a:r>
-              <a:rPr lang="en-US" smtClean="0"/>
+              <a:rPr lang="en-US"/>
               <a:t>Click to edit Master title style</a:t>
             </a:r>
             <a:endParaRPr lang="en-GB"/>
@@ -1845,7 +1845,7 @@
           <a:p>
             <a:pPr lvl="0"/>
             <a:r>
-              <a:rPr lang="en-US" smtClean="0"/>
+              <a:rPr lang="en-US"/>
               <a:t>Click to edit Master text styles</a:t>
             </a:r>
           </a:p>
@@ -1873,35 +1873,35 @@
           <a:p>
             <a:pPr lvl="0"/>
             <a:r>
-              <a:rPr lang="en-US" smtClean="0"/>
+              <a:rPr lang="en-US"/>
               <a:t>Click to edit Master text styles</a:t>
             </a:r>
           </a:p>
           <a:p>
             <a:pPr lvl="1"/>
             <a:r>
-              <a:rPr lang="en-US" smtClean="0"/>
+              <a:rPr lang="en-US"/>
               <a:t>Second level</a:t>
             </a:r>
           </a:p>
           <a:p>
             <a:pPr lvl="2"/>
             <a:r>
-              <a:rPr lang="en-US" smtClean="0"/>
+              <a:rPr lang="en-US"/>
               <a:t>Third level</a:t>
             </a:r>
           </a:p>
           <a:p>
             <a:pPr lvl="3"/>
             <a:r>
-              <a:rPr lang="en-US" smtClean="0"/>
+              <a:rPr lang="en-US"/>
               <a:t>Fourth level</a:t>
             </a:r>
           </a:p>
           <a:p>
             <a:pPr lvl="4"/>
             <a:r>
-              <a:rPr lang="en-US" smtClean="0"/>
+              <a:rPr lang="en-US"/>
               <a:t>Fifth level</a:t>
             </a:r>
             <a:endParaRPr lang="en-GB"/>
@@ -1967,7 +1967,7 @@
           <a:p>
             <a:pPr lvl="0"/>
             <a:r>
-              <a:rPr lang="en-US" smtClean="0"/>
+              <a:rPr lang="en-US"/>
               <a:t>Click to edit Master text styles</a:t>
             </a:r>
           </a:p>
@@ -1995,35 +1995,35 @@
           <a:p>
             <a:pPr lvl="0"/>
             <a:r>
-              <a:rPr lang="en-US" smtClean="0"/>
+              <a:rPr lang="en-US"/>
               <a:t>Click to edit Master text styles</a:t>
             </a:r>
           </a:p>
           <a:p>
             <a:pPr lvl="1"/>
             <a:r>
-              <a:rPr lang="en-US" smtClean="0"/>
+              <a:rPr lang="en-US"/>
               <a:t>Second level</a:t>
             </a:r>
           </a:p>
           <a:p>
             <a:pPr lvl="2"/>
             <a:r>
-              <a:rPr lang="en-US" smtClean="0"/>
+              <a:rPr lang="en-US"/>
               <a:t>Third level</a:t>
             </a:r>
           </a:p>
           <a:p>
             <a:pPr lvl="3"/>
             <a:r>
-              <a:rPr lang="en-US" smtClean="0"/>
+              <a:rPr lang="en-US"/>
               <a:t>Fourth level</a:t>
             </a:r>
           </a:p>
           <a:p>
             <a:pPr lvl="4"/>
             <a:r>
-              <a:rPr lang="en-US" smtClean="0"/>
+              <a:rPr lang="en-US"/>
               <a:t>Fifth level</a:t>
             </a:r>
             <a:endParaRPr lang="en-GB"/>
@@ -2047,7 +2047,7 @@
           <a:p>
             <a:fld id="{D79BA4B9-CCE6-C14B-A854-25D57FDC82A2}" type="datetimeFigureOut">
               <a:rPr lang="en-GB" smtClean="0"/>
-              <a:t>24/01/2019</a:t>
+              <a:t>30/01/2020</a:t>
             </a:fld>
             <a:endParaRPr lang="en-GB"/>
           </a:p>
@@ -2141,7 +2141,7 @@
           <a:lstStyle/>
           <a:p>
             <a:r>
-              <a:rPr lang="en-US" smtClean="0"/>
+              <a:rPr lang="en-US"/>
               <a:t>Click to edit Master title style</a:t>
             </a:r>
             <a:endParaRPr lang="en-GB"/>
@@ -2165,7 +2165,7 @@
           <a:p>
             <a:fld id="{D79BA4B9-CCE6-C14B-A854-25D57FDC82A2}" type="datetimeFigureOut">
               <a:rPr lang="en-GB" smtClean="0"/>
-              <a:t>24/01/2019</a:t>
+              <a:t>30/01/2020</a:t>
             </a:fld>
             <a:endParaRPr lang="en-GB"/>
           </a:p>
@@ -2260,7 +2260,7 @@
           <a:p>
             <a:fld id="{D79BA4B9-CCE6-C14B-A854-25D57FDC82A2}" type="datetimeFigureOut">
               <a:rPr lang="en-GB" smtClean="0"/>
-              <a:t>24/01/2019</a:t>
+              <a:t>30/01/2020</a:t>
             </a:fld>
             <a:endParaRPr lang="en-GB"/>
           </a:p>
@@ -2363,7 +2363,7 @@
           </a:lstStyle>
           <a:p>
             <a:r>
-              <a:rPr lang="en-US" smtClean="0"/>
+              <a:rPr lang="en-US"/>
               <a:t>Click to edit Master title style</a:t>
             </a:r>
             <a:endParaRPr lang="en-GB"/>
@@ -2420,35 +2420,35 @@
           <a:p>
             <a:pPr lvl="0"/>
             <a:r>
-              <a:rPr lang="en-US" smtClean="0"/>
+              <a:rPr lang="en-US"/>
               <a:t>Click to edit Master text styles</a:t>
             </a:r>
           </a:p>
           <a:p>
             <a:pPr lvl="1"/>
             <a:r>
-              <a:rPr lang="en-US" smtClean="0"/>
+              <a:rPr lang="en-US"/>
               <a:t>Second level</a:t>
             </a:r>
           </a:p>
           <a:p>
             <a:pPr lvl="2"/>
             <a:r>
-              <a:rPr lang="en-US" smtClean="0"/>
+              <a:rPr lang="en-US"/>
               <a:t>Third level</a:t>
             </a:r>
           </a:p>
           <a:p>
             <a:pPr lvl="3"/>
             <a:r>
-              <a:rPr lang="en-US" smtClean="0"/>
+              <a:rPr lang="en-US"/>
               <a:t>Fourth level</a:t>
             </a:r>
           </a:p>
           <a:p>
             <a:pPr lvl="4"/>
             <a:r>
-              <a:rPr lang="en-US" smtClean="0"/>
+              <a:rPr lang="en-US"/>
               <a:t>Fifth level</a:t>
             </a:r>
             <a:endParaRPr lang="en-GB"/>
@@ -2514,7 +2514,7 @@
           <a:p>
             <a:pPr lvl="0"/>
             <a:r>
-              <a:rPr lang="en-US" smtClean="0"/>
+              <a:rPr lang="en-US"/>
               <a:t>Click to edit Master text styles</a:t>
             </a:r>
           </a:p>
@@ -2537,7 +2537,7 @@
           <a:p>
             <a:fld id="{D79BA4B9-CCE6-C14B-A854-25D57FDC82A2}" type="datetimeFigureOut">
               <a:rPr lang="en-GB" smtClean="0"/>
-              <a:t>24/01/2019</a:t>
+              <a:t>30/01/2020</a:t>
             </a:fld>
             <a:endParaRPr lang="en-GB"/>
           </a:p>
@@ -2640,7 +2640,7 @@
           </a:lstStyle>
           <a:p>
             <a:r>
-              <a:rPr lang="en-US" smtClean="0"/>
+              <a:rPr lang="en-US"/>
               <a:t>Click to edit Master title style</a:t>
             </a:r>
             <a:endParaRPr lang="en-GB"/>
@@ -2767,7 +2767,7 @@
           <a:p>
             <a:pPr lvl="0"/>
             <a:r>
-              <a:rPr lang="en-US" smtClean="0"/>
+              <a:rPr lang="en-US"/>
               <a:t>Click to edit Master text styles</a:t>
             </a:r>
           </a:p>
@@ -2790,7 +2790,7 @@
           <a:p>
             <a:fld id="{D79BA4B9-CCE6-C14B-A854-25D57FDC82A2}" type="datetimeFigureOut">
               <a:rPr lang="en-GB" smtClean="0"/>
-              <a:t>24/01/2019</a:t>
+              <a:t>30/01/2020</a:t>
             </a:fld>
             <a:endParaRPr lang="en-GB"/>
           </a:p>
@@ -2899,7 +2899,7 @@
           <a:lstStyle/>
           <a:p>
             <a:r>
-              <a:rPr lang="en-US" smtClean="0"/>
+              <a:rPr lang="en-US"/>
               <a:t>Click to edit Master title style</a:t>
             </a:r>
             <a:endParaRPr lang="en-GB"/>
@@ -2933,35 +2933,35 @@
           <a:p>
             <a:pPr lvl="0"/>
             <a:r>
-              <a:rPr lang="en-US" smtClean="0"/>
+              <a:rPr lang="en-US"/>
               <a:t>Click to edit Master text styles</a:t>
             </a:r>
           </a:p>
           <a:p>
             <a:pPr lvl="1"/>
             <a:r>
-              <a:rPr lang="en-US" smtClean="0"/>
+              <a:rPr lang="en-US"/>
               <a:t>Second level</a:t>
             </a:r>
           </a:p>
           <a:p>
             <a:pPr lvl="2"/>
             <a:r>
-              <a:rPr lang="en-US" smtClean="0"/>
+              <a:rPr lang="en-US"/>
               <a:t>Third level</a:t>
             </a:r>
           </a:p>
           <a:p>
             <a:pPr lvl="3"/>
             <a:r>
-              <a:rPr lang="en-US" smtClean="0"/>
+              <a:rPr lang="en-US"/>
               <a:t>Fourth level</a:t>
             </a:r>
           </a:p>
           <a:p>
             <a:pPr lvl="4"/>
             <a:r>
-              <a:rPr lang="en-US" smtClean="0"/>
+              <a:rPr lang="en-US"/>
               <a:t>Fifth level</a:t>
             </a:r>
             <a:endParaRPr lang="en-GB"/>
@@ -3003,7 +3003,7 @@
           <a:p>
             <a:fld id="{D79BA4B9-CCE6-C14B-A854-25D57FDC82A2}" type="datetimeFigureOut">
               <a:rPr lang="en-GB" smtClean="0"/>
-              <a:t>24/01/2019</a:t>
+              <a:t>30/01/2020</a:t>
             </a:fld>
             <a:endParaRPr lang="en-GB"/>
           </a:p>
@@ -3431,7 +3431,7 @@
           <a:lstStyle/>
           <a:p>
             <a:r>
-              <a:rPr lang="en-GB" dirty="0" smtClean="0"/>
+              <a:rPr lang="en-GB" dirty="0"/>
               <a:t>Week 3 Data analysis practical</a:t>
             </a:r>
           </a:p>
@@ -3460,40 +3460,32 @@
           <a:lstStyle/>
           <a:p>
             <a:r>
-              <a:rPr lang="en-GB" dirty="0" err="1" smtClean="0"/>
+              <a:rPr lang="en-GB" dirty="0" err="1"/>
               <a:t>Ioanna</a:t>
             </a:r>
             <a:r>
-              <a:rPr lang="en-GB" dirty="0" smtClean="0"/>
+              <a:rPr lang="en-GB" dirty="0"/>
               <a:t> </a:t>
             </a:r>
             <a:r>
-              <a:rPr lang="en-GB" dirty="0" err="1" smtClean="0"/>
+              <a:rPr lang="en-GB" dirty="0" err="1"/>
               <a:t>Tzoulaki</a:t>
             </a:r>
             <a:r>
               <a:rPr lang="en-US" dirty="0"/>
-              <a:t> </a:t>
-            </a:r>
-            <a:r>
-              <a:rPr lang="en-US" dirty="0" smtClean="0"/>
-              <a:t>and Antonio J. Berlanga-Taylor</a:t>
-            </a:r>
-          </a:p>
-          <a:p>
-            <a:r>
-              <a:rPr lang="en-US" dirty="0" smtClean="0"/>
+              <a:t> and Antonio J. Berlanga-Taylor</a:t>
+            </a:r>
+          </a:p>
+          <a:p>
+            <a:r>
+              <a:rPr lang="en-US" dirty="0"/>
               <a:t>Molecular and Genetic Epidemiology Module</a:t>
             </a:r>
           </a:p>
           <a:p>
             <a:r>
-              <a:rPr lang="en-GB" dirty="0" smtClean="0"/>
-              <a:t>MRC-PHE </a:t>
-            </a:r>
-            <a:r>
               <a:rPr lang="en-GB" dirty="0"/>
-              <a:t>Centre for Environment and Health</a:t>
+              <a:t>MRC-PHE Centre for Environment and Health</a:t>
             </a:r>
           </a:p>
           <a:p>
@@ -3517,13 +3509,6 @@
   <p:clrMapOvr>
     <a:masterClrMapping/>
   </p:clrMapOvr>
-  <p:timing>
-    <p:tnLst>
-      <p:par>
-        <p:cTn id="1" dur="indefinite" restart="never" nodeType="tmRoot"/>
-      </p:par>
-    </p:tnLst>
-  </p:timing>
 </p:sld>
 </file>
 
@@ -3560,10 +3545,9 @@
           <a:lstStyle/>
           <a:p>
             <a:r>
-              <a:rPr lang="en-GB" dirty="0" smtClean="0"/>
+              <a:rPr lang="en-GB" dirty="0"/>
               <a:t>Week 3 Data analysis practical</a:t>
             </a:r>
-            <a:endParaRPr lang="en-GB" dirty="0"/>
           </a:p>
         </p:txBody>
       </p:sp>
@@ -3580,32 +3564,32 @@
         <p:spPr>
           <a:xfrm>
             <a:off x="838200" y="1489166"/>
-            <a:ext cx="10515600" cy="4687797"/>
+            <a:ext cx="10515600" cy="5164297"/>
           </a:xfrm>
         </p:spPr>
         <p:txBody>
           <a:bodyPr>
-            <a:normAutofit fontScale="92500" lnSpcReduction="10000"/>
+            <a:normAutofit fontScale="85000" lnSpcReduction="20000"/>
           </a:bodyPr>
           <a:lstStyle/>
           <a:p>
             <a:r>
-              <a:rPr lang="en-GB" dirty="0" smtClean="0"/>
+              <a:rPr lang="en-GB" dirty="0"/>
               <a:t>Software installation</a:t>
             </a:r>
           </a:p>
           <a:p>
             <a:pPr lvl="1"/>
             <a:r>
-              <a:rPr lang="en-GB" sz="2400" dirty="0" smtClean="0"/>
+              <a:rPr lang="en-GB" sz="2400" dirty="0"/>
               <a:t>We will need R, </a:t>
             </a:r>
             <a:r>
-              <a:rPr lang="en-GB" sz="2400" dirty="0" err="1" smtClean="0"/>
+              <a:rPr lang="en-GB" sz="2400" dirty="0" err="1"/>
               <a:t>Rstudio</a:t>
             </a:r>
             <a:r>
-              <a:rPr lang="en-GB" sz="2400" dirty="0" smtClean="0"/>
+              <a:rPr lang="en-GB" sz="2400" dirty="0"/>
               <a:t>, and a browser for this session only. If you don’t have them visit this page for further instructions:</a:t>
             </a:r>
           </a:p>
@@ -3624,7 +3608,7 @@
           <a:p>
             <a:pPr lvl="1"/>
             <a:r>
-              <a:rPr lang="en-GB" sz="2400" dirty="0" smtClean="0"/>
+              <a:rPr lang="en-GB" sz="2400" dirty="0"/>
               <a:t>We will also need several R packages. Please install:</a:t>
             </a:r>
           </a:p>
@@ -3632,26 +3616,22 @@
             <a:pPr lvl="2"/>
             <a:r>
               <a:rPr lang="en-GB" dirty="0" err="1"/>
-              <a:t>k</a:t>
-            </a:r>
-            <a:r>
-              <a:rPr lang="en-GB" dirty="0" err="1" smtClean="0"/>
-              <a:t>nitr</a:t>
-            </a:r>
-            <a:r>
-              <a:rPr lang="en-GB" dirty="0" smtClean="0"/>
+              <a:t>knitr</a:t>
+            </a:r>
+            <a:r>
+              <a:rPr lang="en-GB" dirty="0"/>
               <a:t>, ggplot2, car, </a:t>
             </a:r>
             <a:r>
-              <a:rPr lang="en-GB" dirty="0" err="1" smtClean="0"/>
+              <a:rPr lang="en-GB" dirty="0" err="1"/>
               <a:t>gvlma</a:t>
             </a:r>
             <a:r>
-              <a:rPr lang="en-GB" dirty="0" smtClean="0"/>
+              <a:rPr lang="en-GB" dirty="0"/>
               <a:t>, </a:t>
             </a:r>
             <a:r>
-              <a:rPr lang="en-GB" dirty="0" err="1" smtClean="0"/>
+              <a:rPr lang="en-GB" dirty="0" err="1"/>
               <a:t>plyr</a:t>
             </a:r>
             <a:r>
@@ -3659,7 +3639,7 @@
               <a:t> and </a:t>
             </a:r>
             <a:r>
-              <a:rPr lang="en-GB" dirty="0" err="1" smtClean="0"/>
+              <a:rPr lang="en-GB" dirty="0" err="1"/>
               <a:t>MatrixEQTL</a:t>
             </a:r>
             <a:endParaRPr lang="en-GB" dirty="0"/>
@@ -3669,11 +3649,11 @@
               <a:buNone/>
             </a:pPr>
             <a:r>
-              <a:rPr lang="en-GB" dirty="0" smtClean="0"/>
+              <a:rPr lang="en-GB" dirty="0"/>
               <a:t>u</a:t>
             </a:r>
             <a:r>
-              <a:rPr lang="en-GB" sz="2000" dirty="0" smtClean="0"/>
+              <a:rPr lang="en-GB" sz="2000" dirty="0"/>
               <a:t>sing e.g.</a:t>
             </a:r>
           </a:p>
@@ -3698,7 +3678,7 @@
               <a:t>biocLite.R</a:t>
             </a:r>
             <a:r>
-              <a:rPr lang="en-GB" dirty="0" smtClean="0"/>
+              <a:rPr lang="en-GB" dirty="0"/>
               <a:t>")</a:t>
             </a:r>
           </a:p>
@@ -3707,11 +3687,11 @@
               <a:buNone/>
             </a:pPr>
             <a:r>
-              <a:rPr lang="en-GB" dirty="0" err="1" smtClean="0"/>
+              <a:rPr lang="en-GB" dirty="0" err="1"/>
               <a:t>biocLite</a:t>
             </a:r>
             <a:r>
-              <a:rPr lang="en-GB" dirty="0" smtClean="0"/>
+              <a:rPr lang="en-GB" dirty="0"/>
               <a:t>()</a:t>
             </a:r>
           </a:p>
@@ -3720,34 +3700,34 @@
               <a:buNone/>
             </a:pPr>
             <a:r>
-              <a:rPr lang="en-GB" dirty="0" err="1" smtClean="0"/>
+              <a:rPr lang="en-GB" dirty="0" err="1"/>
               <a:t>biocLite</a:t>
             </a:r>
             <a:r>
               <a:rPr lang="en-GB" dirty="0"/>
               <a:t>('package')</a:t>
             </a:r>
-            <a:endParaRPr lang="en-GB" sz="2000" dirty="0" smtClean="0"/>
+            <a:endParaRPr lang="en-GB" sz="2000" dirty="0"/>
           </a:p>
           <a:p>
             <a:pPr lvl="1"/>
             <a:r>
-              <a:rPr lang="en-GB" dirty="0" smtClean="0"/>
+              <a:rPr lang="en-GB" dirty="0"/>
               <a:t>Please bring your computer, work in pairs or make sure there will be a desktop to use with the required software and packages.</a:t>
             </a:r>
           </a:p>
           <a:p>
             <a:pPr lvl="1"/>
             <a:r>
-              <a:rPr lang="en-GB" dirty="0" smtClean="0"/>
+              <a:rPr lang="en-GB" dirty="0"/>
               <a:t>You’ll need to download the </a:t>
             </a:r>
             <a:r>
-              <a:rPr lang="en-GB" dirty="0" err="1" smtClean="0"/>
+              <a:rPr lang="en-GB" dirty="0" err="1"/>
               <a:t>practicals</a:t>
             </a:r>
             <a:r>
-              <a:rPr lang="en-GB" dirty="0" smtClean="0"/>
+              <a:rPr lang="en-GB" dirty="0"/>
               <a:t> from Blackboard or from:</a:t>
             </a:r>
           </a:p>
@@ -3763,36 +3743,48 @@
           <a:p>
             <a:pPr lvl="2"/>
             <a:r>
-              <a:rPr lang="en-GB" dirty="0" smtClean="0">
-                <a:hlinkClick r:id="rId3"/>
-              </a:rPr>
-              <a:t>https</a:t>
-            </a:r>
-            <a:r>
               <a:rPr lang="en-GB" dirty="0">
                 <a:hlinkClick r:id="rId3"/>
               </a:rPr>
-              <a:t>://</a:t>
-            </a:r>
-            <a:r>
-              <a:rPr lang="en-GB" dirty="0" smtClean="0">
-                <a:hlinkClick r:id="rId3"/>
+              <a:t>https://github.com/AntonioJBT/teaching_ICL/tree/master/code</a:t>
+            </a:r>
+            <a:endParaRPr lang="en-GB" dirty="0"/>
+          </a:p>
+          <a:p>
+            <a:pPr lvl="1"/>
+            <a:r>
+              <a:rPr lang="en-GB" dirty="0"/>
+              <a:t>Data for practical 2b can be downloaded from:</a:t>
+            </a:r>
+          </a:p>
+          <a:p>
+            <a:pPr lvl="2"/>
+            <a:r>
+              <a:rPr lang="en-GB" dirty="0">
+                <a:hlinkClick r:id="rId4"/>
               </a:rPr>
-              <a:t>github.com/AntonioJBT/teaching_ICL/tree/master/code</a:t>
-            </a:r>
-            <a:endParaRPr lang="en-GB" dirty="0" smtClean="0"/>
+              <a:t>https://tinyurl.com/tu25pwj</a:t>
+            </a:r>
           </a:p>
           <a:p>
             <a:pPr lvl="2"/>
-            <a:endParaRPr lang="en-GB" dirty="0" smtClean="0"/>
-          </a:p>
-          <a:p>
-            <a:pPr lvl="1"/>
-            <a:endParaRPr lang="en-GB" dirty="0"/>
-          </a:p>
-          <a:p>
-            <a:pPr lvl="1"/>
-            <a:endParaRPr lang="en-GB" sz="2400" dirty="0" smtClean="0"/>
+            <a:r>
+              <a:rPr lang="en-GB" dirty="0"/>
+              <a:t>Full link: </a:t>
+            </a:r>
+            <a:r>
+              <a:rPr lang="en-GB" dirty="0">
+                <a:hlinkClick r:id="rId4"/>
+              </a:rPr>
+              <a:t>https://imperiallondon-my.sharepoint.com/:u:/g/personal/aberlang_ic_ac_uk/Ee_m-v4TkSxKqyuaWQOWFtABADkCXpaHEKuOa4mtcfu2eA?e</a:t>
+            </a:r>
+            <a:r>
+              <a:rPr lang="en-GB">
+                <a:hlinkClick r:id="rId4"/>
+              </a:rPr>
+              <a:t>=Ezc7BZ</a:t>
+            </a:r>
+            <a:endParaRPr lang="en-GB" sz="2400" dirty="0"/>
           </a:p>
         </p:txBody>
       </p:sp>
@@ -3806,13 +3798,6 @@
   <p:clrMapOvr>
     <a:masterClrMapping/>
   </p:clrMapOvr>
-  <p:timing>
-    <p:tnLst>
-      <p:par>
-        <p:cTn id="1" dur="indefinite" restart="never" nodeType="tmRoot"/>
-      </p:par>
-    </p:tnLst>
-  </p:timing>
 </p:sld>
 </file>
 
@@ -3849,10 +3834,9 @@
           <a:lstStyle/>
           <a:p>
             <a:r>
-              <a:rPr lang="en-GB" dirty="0" smtClean="0"/>
+              <a:rPr lang="en-GB" dirty="0"/>
               <a:t>Questions?</a:t>
             </a:r>
-            <a:endParaRPr lang="en-GB" dirty="0"/>
           </a:p>
         </p:txBody>
       </p:sp>
@@ -3872,16 +3856,16 @@
           <a:lstStyle/>
           <a:p>
             <a:r>
-              <a:rPr lang="en-GB" dirty="0" smtClean="0"/>
+              <a:rPr lang="en-GB" dirty="0"/>
               <a:t>Email us if needed: </a:t>
             </a:r>
             <a:r>
-              <a:rPr lang="en-GB" dirty="0" smtClean="0">
+              <a:rPr lang="en-GB" dirty="0">
                 <a:hlinkClick r:id="rId2"/>
               </a:rPr>
               <a:t>a.berlanga@imperial.ac.uk</a:t>
             </a:r>
-            <a:endParaRPr lang="en-GB" dirty="0" smtClean="0"/>
+            <a:endParaRPr lang="en-GB" dirty="0"/>
           </a:p>
           <a:p>
             <a:endParaRPr lang="en-GB" dirty="0"/>

</xml_diff>

<commit_message>
changes for 2021 tutorials
</commit_message>
<xml_diff>
--- a/docs/ioanna_antonio_week_2_analysis_practical.pptx
+++ b/docs/ioanna_antonio_week_2_analysis_practical.pptx
@@ -199,7 +199,7 @@
           <a:p>
             <a:fld id="{E63B2B30-6B68-5649-8E90-3E3C690752BE}" type="datetimeFigureOut">
               <a:rPr lang="en-GB" smtClean="0"/>
-              <a:t>30/01/2020</a:t>
+              <a:t>03/02/2021</a:t>
             </a:fld>
             <a:endParaRPr lang="en-GB"/>
           </a:p>
@@ -682,7 +682,7 @@
           <a:p>
             <a:fld id="{D79BA4B9-CCE6-C14B-A854-25D57FDC82A2}" type="datetimeFigureOut">
               <a:rPr lang="en-GB" smtClean="0"/>
-              <a:t>30/01/2020</a:t>
+              <a:t>03/02/2021</a:t>
             </a:fld>
             <a:endParaRPr lang="en-GB"/>
           </a:p>
@@ -852,7 +852,7 @@
           <a:p>
             <a:fld id="{D79BA4B9-CCE6-C14B-A854-25D57FDC82A2}" type="datetimeFigureOut">
               <a:rPr lang="en-GB" smtClean="0"/>
-              <a:t>30/01/2020</a:t>
+              <a:t>03/02/2021</a:t>
             </a:fld>
             <a:endParaRPr lang="en-GB"/>
           </a:p>
@@ -1032,7 +1032,7 @@
           <a:p>
             <a:fld id="{D79BA4B9-CCE6-C14B-A854-25D57FDC82A2}" type="datetimeFigureOut">
               <a:rPr lang="en-GB" smtClean="0"/>
-              <a:t>30/01/2020</a:t>
+              <a:t>03/02/2021</a:t>
             </a:fld>
             <a:endParaRPr lang="en-GB"/>
           </a:p>
@@ -1202,7 +1202,7 @@
           <a:p>
             <a:fld id="{D79BA4B9-CCE6-C14B-A854-25D57FDC82A2}" type="datetimeFigureOut">
               <a:rPr lang="en-GB" smtClean="0"/>
-              <a:t>30/01/2020</a:t>
+              <a:t>03/02/2021</a:t>
             </a:fld>
             <a:endParaRPr lang="en-GB"/>
           </a:p>
@@ -1448,7 +1448,7 @@
           <a:p>
             <a:fld id="{D79BA4B9-CCE6-C14B-A854-25D57FDC82A2}" type="datetimeFigureOut">
               <a:rPr lang="en-GB" smtClean="0"/>
-              <a:t>30/01/2020</a:t>
+              <a:t>03/02/2021</a:t>
             </a:fld>
             <a:endParaRPr lang="en-GB"/>
           </a:p>
@@ -1680,7 +1680,7 @@
           <a:p>
             <a:fld id="{D79BA4B9-CCE6-C14B-A854-25D57FDC82A2}" type="datetimeFigureOut">
               <a:rPr lang="en-GB" smtClean="0"/>
-              <a:t>30/01/2020</a:t>
+              <a:t>03/02/2021</a:t>
             </a:fld>
             <a:endParaRPr lang="en-GB"/>
           </a:p>
@@ -2047,7 +2047,7 @@
           <a:p>
             <a:fld id="{D79BA4B9-CCE6-C14B-A854-25D57FDC82A2}" type="datetimeFigureOut">
               <a:rPr lang="en-GB" smtClean="0"/>
-              <a:t>30/01/2020</a:t>
+              <a:t>03/02/2021</a:t>
             </a:fld>
             <a:endParaRPr lang="en-GB"/>
           </a:p>
@@ -2165,7 +2165,7 @@
           <a:p>
             <a:fld id="{D79BA4B9-CCE6-C14B-A854-25D57FDC82A2}" type="datetimeFigureOut">
               <a:rPr lang="en-GB" smtClean="0"/>
-              <a:t>30/01/2020</a:t>
+              <a:t>03/02/2021</a:t>
             </a:fld>
             <a:endParaRPr lang="en-GB"/>
           </a:p>
@@ -2260,7 +2260,7 @@
           <a:p>
             <a:fld id="{D79BA4B9-CCE6-C14B-A854-25D57FDC82A2}" type="datetimeFigureOut">
               <a:rPr lang="en-GB" smtClean="0"/>
-              <a:t>30/01/2020</a:t>
+              <a:t>03/02/2021</a:t>
             </a:fld>
             <a:endParaRPr lang="en-GB"/>
           </a:p>
@@ -2537,7 +2537,7 @@
           <a:p>
             <a:fld id="{D79BA4B9-CCE6-C14B-A854-25D57FDC82A2}" type="datetimeFigureOut">
               <a:rPr lang="en-GB" smtClean="0"/>
-              <a:t>30/01/2020</a:t>
+              <a:t>03/02/2021</a:t>
             </a:fld>
             <a:endParaRPr lang="en-GB"/>
           </a:p>
@@ -2790,7 +2790,7 @@
           <a:p>
             <a:fld id="{D79BA4B9-CCE6-C14B-A854-25D57FDC82A2}" type="datetimeFigureOut">
               <a:rPr lang="en-GB" smtClean="0"/>
-              <a:t>30/01/2020</a:t>
+              <a:t>03/02/2021</a:t>
             </a:fld>
             <a:endParaRPr lang="en-GB"/>
           </a:p>
@@ -3003,7 +3003,7 @@
           <a:p>
             <a:fld id="{D79BA4B9-CCE6-C14B-A854-25D57FDC82A2}" type="datetimeFigureOut">
               <a:rPr lang="en-GB" smtClean="0"/>
-              <a:t>30/01/2020</a:t>
+              <a:t>03/02/2021</a:t>
             </a:fld>
             <a:endParaRPr lang="en-GB"/>
           </a:p>
@@ -3432,7 +3432,14 @@
           <a:p>
             <a:r>
               <a:rPr lang="en-GB" dirty="0"/>
-              <a:t>Week 3 Data analysis practical</a:t>
+              <a:t>Data analysis practical</a:t>
+            </a:r>
+            <a:br>
+              <a:rPr lang="en-GB" dirty="0"/>
+            </a:br>
+            <a:r>
+              <a:rPr lang="en-GB" dirty="0"/>
+              <a:t>Quantitative Trait Loci</a:t>
             </a:r>
           </a:p>
         </p:txBody>
@@ -3460,20 +3467,8 @@
           <a:lstStyle/>
           <a:p>
             <a:r>
-              <a:rPr lang="en-GB" dirty="0" err="1"/>
-              <a:t>Ioanna</a:t>
-            </a:r>
-            <a:r>
-              <a:rPr lang="en-GB" dirty="0"/>
-              <a:t> </a:t>
-            </a:r>
-            <a:r>
-              <a:rPr lang="en-GB" dirty="0" err="1"/>
-              <a:t>Tzoulaki</a:t>
-            </a:r>
-            <a:r>
               <a:rPr lang="en-US" dirty="0"/>
-              <a:t> and Antonio J. Berlanga-Taylor</a:t>
+              <a:t>Antonio J. Berlanga-Taylor</a:t>
             </a:r>
           </a:p>
           <a:p>
@@ -3485,7 +3480,7 @@
           <a:p>
             <a:r>
               <a:rPr lang="en-GB" dirty="0"/>
-              <a:t>MRC-PHE Centre for Environment and Health</a:t>
+              <a:t>Department of Epidemiology and Biostatistics</a:t>
             </a:r>
           </a:p>
           <a:p>
@@ -3546,7 +3541,7 @@
           <a:p>
             <a:r>
               <a:rPr lang="en-GB" dirty="0"/>
-              <a:t>Week 3 Data analysis practical</a:t>
+              <a:t>Data analysis practical - QTLs</a:t>
             </a:r>
           </a:p>
         </p:txBody>
@@ -3569,9 +3564,18 @@
         </p:spPr>
         <p:txBody>
           <a:bodyPr>
-            <a:normAutofit fontScale="85000" lnSpcReduction="20000"/>
+            <a:normAutofit lnSpcReduction="10000"/>
           </a:bodyPr>
           <a:lstStyle/>
+          <a:p>
+            <a:pPr marL="0" indent="0">
+              <a:buNone/>
+            </a:pPr>
+            <a:r>
+              <a:rPr lang="en-GB" dirty="0"/>
+              <a:t>If you want to run the tutorials in your own time:</a:t>
+            </a:r>
+          </a:p>
           <a:p>
             <a:r>
               <a:rPr lang="en-GB" dirty="0"/>
@@ -3713,22 +3717,7 @@
             <a:pPr lvl="1"/>
             <a:r>
               <a:rPr lang="en-GB" dirty="0"/>
-              <a:t>Please bring your computer, work in pairs or make sure there will be a desktop to use with the required software and packages.</a:t>
-            </a:r>
-          </a:p>
-          <a:p>
-            <a:pPr lvl="1"/>
-            <a:r>
-              <a:rPr lang="en-GB" dirty="0"/>
-              <a:t>You’ll need to download the </a:t>
-            </a:r>
-            <a:r>
-              <a:rPr lang="en-GB" dirty="0" err="1"/>
-              <a:t>practicals</a:t>
-            </a:r>
-            <a:r>
-              <a:rPr lang="en-GB" dirty="0"/>
-              <a:t> from Blackboard or from:</a:t>
+              <a:t>You’ll need to download the practicals from Blackboard or from:</a:t>
             </a:r>
           </a:p>
           <a:p>
@@ -3741,20 +3730,10 @@
             </a:r>
           </a:p>
           <a:p>
-            <a:pPr lvl="2"/>
-            <a:r>
-              <a:rPr lang="en-GB" dirty="0">
-                <a:hlinkClick r:id="rId3"/>
-              </a:rPr>
-              <a:t>https://github.com/AntonioJBT/teaching_ICL/tree/master/code</a:t>
-            </a:r>
-            <a:endParaRPr lang="en-GB" dirty="0"/>
-          </a:p>
-          <a:p>
             <a:pPr lvl="1"/>
             <a:r>
               <a:rPr lang="en-GB" dirty="0"/>
-              <a:t>Data for practical 2b can be downloaded from:</a:t>
+              <a:t>Data for practical 2b can be generated following instructions in:</a:t>
             </a:r>
           </a:p>
           <a:p>
@@ -3763,28 +3742,9 @@
               <a:rPr lang="en-GB" dirty="0">
                 <a:hlinkClick r:id="rId4"/>
               </a:rPr>
-              <a:t>https://tinyurl.com/tu25pwj</a:t>
-            </a:r>
-          </a:p>
-          <a:p>
-            <a:pPr lvl="2"/>
-            <a:r>
-              <a:rPr lang="en-GB" dirty="0"/>
-              <a:t>Full link: </a:t>
-            </a:r>
-            <a:r>
-              <a:rPr lang="en-GB" dirty="0">
-                <a:hlinkClick r:id="rId4"/>
-              </a:rPr>
-              <a:t>https://imperiallondon-my.sharepoint.com/:u:/g/personal/aberlang_ic_ac_uk/Ee_m-v4TkSxKqyuaWQOWFtABADkCXpaHEKuOa4mtcfu2eA?e</a:t>
-            </a:r>
-            <a:r>
-              <a:rPr lang="en-GB">
-                <a:hlinkClick r:id="rId4"/>
-              </a:rPr>
-              <a:t>=Ezc7BZ</a:t>
-            </a:r>
-            <a:endParaRPr lang="en-GB" sz="2400" dirty="0"/>
+              <a:t>https://github.com/AntonioJBT/teaching_ICL/blob/master/data/README_sim_data.txt</a:t>
+            </a:r>
+            <a:endParaRPr lang="en-GB" dirty="0"/>
           </a:p>
         </p:txBody>
       </p:sp>
@@ -3857,7 +3817,7 @@
           <a:p>
             <a:r>
               <a:rPr lang="en-GB" dirty="0"/>
-              <a:t>Email us if needed: </a:t>
+              <a:t>Email: </a:t>
             </a:r>
             <a:r>
               <a:rPr lang="en-GB" dirty="0">

</xml_diff>